<commit_message>
upload new versions of acrl scholcomm slides
</commit_message>
<xml_diff>
--- a/media/JylisaDoney_ACRL-ScholarlyCommunicationsCookbook_KeyIngredients.pptx
+++ b/media/JylisaDoney_ACRL-ScholarlyCommunicationsCookbook_KeyIngredients.pptx
@@ -159,7 +159,7 @@
   <pc:docChgLst>
     <pc:chgData name="Doney, Jylisa (jylisadoney@uidaho.edu)" userId="ca63ff72-312b-43e3-9de3-54afc5ff377f" providerId="ADAL" clId="{3A09B9FB-34BF-4B51-A684-70744E18D85C}"/>
     <pc:docChg chg="undo custSel addSld delSld modSld">
-      <pc:chgData name="Doney, Jylisa (jylisadoney@uidaho.edu)" userId="ca63ff72-312b-43e3-9de3-54afc5ff377f" providerId="ADAL" clId="{3A09B9FB-34BF-4B51-A684-70744E18D85C}" dt="2020-04-27T22:15:01.011" v="1842" actId="114"/>
+      <pc:chgData name="Doney, Jylisa (jylisadoney@uidaho.edu)" userId="ca63ff72-312b-43e3-9de3-54afc5ff377f" providerId="ADAL" clId="{3A09B9FB-34BF-4B51-A684-70744E18D85C}" dt="2020-04-28T00:48:09.218" v="1845" actId="20577"/>
       <pc:docMkLst>
         <pc:docMk/>
       </pc:docMkLst>
@@ -334,6 +334,21 @@
           <ac:spMkLst>
             <pc:docMk/>
             <pc:sldMk cId="2067043111" sldId="267"/>
+            <ac:spMk id="3" creationId="{00000000-0000-0000-0000-000000000000}"/>
+          </ac:spMkLst>
+        </pc:spChg>
+      </pc:sldChg>
+      <pc:sldChg chg="modSp">
+        <pc:chgData name="Doney, Jylisa (jylisadoney@uidaho.edu)" userId="ca63ff72-312b-43e3-9de3-54afc5ff377f" providerId="ADAL" clId="{3A09B9FB-34BF-4B51-A684-70744E18D85C}" dt="2020-04-28T00:48:09.218" v="1845" actId="20577"/>
+        <pc:sldMkLst>
+          <pc:docMk/>
+          <pc:sldMk cId="3973670987" sldId="269"/>
+        </pc:sldMkLst>
+        <pc:spChg chg="mod">
+          <ac:chgData name="Doney, Jylisa (jylisadoney@uidaho.edu)" userId="ca63ff72-312b-43e3-9de3-54afc5ff377f" providerId="ADAL" clId="{3A09B9FB-34BF-4B51-A684-70744E18D85C}" dt="2020-04-28T00:48:09.218" v="1845" actId="20577"/>
+          <ac:spMkLst>
+            <pc:docMk/>
+            <pc:sldMk cId="3973670987" sldId="269"/>
             <ac:spMk id="3" creationId="{00000000-0000-0000-0000-000000000000}"/>
           </ac:spMkLst>
         </pc:spChg>
@@ -8325,7 +8340,15 @@
           <a:p>
             <a:r>
               <a:rPr lang="en-US" dirty="0"/>
-              <a:t>Compare and contrast the self-archiving policies for three journals</a:t>
+              <a:t>Compare and contrast the self-archiving policies </a:t>
+            </a:r>
+            <a:r>
+              <a:rPr lang="en-US"/>
+              <a:t>for two </a:t>
+            </a:r>
+            <a:r>
+              <a:rPr lang="en-US" dirty="0"/>
+              <a:t>journals</a:t>
             </a:r>
           </a:p>
           <a:p>
@@ -11707,6 +11730,15 @@
 </file>
 
 <file path=customXml/item2.xml><?xml version="1.0" encoding="utf-8"?>
+<?mso-contentType ?>
+<FormTemplates xmlns="http://schemas.microsoft.com/sharepoint/v3/contenttype/forms">
+  <Display>DocumentLibraryForm</Display>
+  <Edit>DocumentLibraryForm</Edit>
+  <New>DocumentLibraryForm</New>
+</FormTemplates>
+</file>
+
+<file path=customXml/item3.xml><?xml version="1.0" encoding="utf-8"?>
 <ct:contentTypeSchema xmlns:ct="http://schemas.microsoft.com/office/2006/metadata/contentType" xmlns:ma="http://schemas.microsoft.com/office/2006/metadata/properties/metaAttributes" ct:_="" ma:_="" ma:contentTypeName="Document" ma:contentTypeID="0x010100B0C66D0D2AA8ED458867DFFBC84CDC81" ma:contentTypeVersion="12" ma:contentTypeDescription="Create a new document." ma:contentTypeScope="" ma:versionID="2edda66bea43fd3ee2cdae44f7ddc19d">
   <xsd:schema xmlns:xsd="http://www.w3.org/2001/XMLSchema" xmlns:xs="http://www.w3.org/2001/XMLSchema" xmlns:p="http://schemas.microsoft.com/office/2006/metadata/properties" xmlns:ns3="eb6fc25e-8a44-440c-a3c6-cb56c05aabb1" xmlns:ns4="115ac59a-381b-4183-bd5b-b04edbe7f2fc" targetNamespace="http://schemas.microsoft.com/office/2006/metadata/properties" ma:root="true" ma:fieldsID="5a209599921d322b183a16cd30a65124" ns3:_="" ns4:_="">
     <xsd:import namespace="eb6fc25e-8a44-440c-a3c6-cb56c05aabb1"/>
@@ -11923,33 +11955,32 @@
 </ct:contentTypeSchema>
 </file>
 
-<file path=customXml/item3.xml><?xml version="1.0" encoding="utf-8"?>
-<?mso-contentType ?>
-<FormTemplates xmlns="http://schemas.microsoft.com/sharepoint/v3/contenttype/forms">
-  <Display>DocumentLibraryForm</Display>
-  <Edit>DocumentLibraryForm</Edit>
-  <New>DocumentLibraryForm</New>
-</FormTemplates>
-</file>
-
 <file path=customXml/itemProps1.xml><?xml version="1.0" encoding="utf-8"?>
 <ds:datastoreItem xmlns:ds="http://schemas.openxmlformats.org/officeDocument/2006/customXml" ds:itemID="{0D2CA708-394D-4A00-A7C9-BA82E8F3255C}">
   <ds:schemaRefs>
-    <ds:schemaRef ds:uri="http://purl.org/dc/terms/"/>
+    <ds:schemaRef ds:uri="http://schemas.openxmlformats.org/package/2006/metadata/core-properties"/>
+    <ds:schemaRef ds:uri="115ac59a-381b-4183-bd5b-b04edbe7f2fc"/>
+    <ds:schemaRef ds:uri="http://purl.org/dc/elements/1.1/"/>
     <ds:schemaRef ds:uri="http://purl.org/dc/dcmitype/"/>
     <ds:schemaRef ds:uri="eb6fc25e-8a44-440c-a3c6-cb56c05aabb1"/>
-    <ds:schemaRef ds:uri="http://schemas.openxmlformats.org/package/2006/metadata/core-properties"/>
-    <ds:schemaRef ds:uri="115ac59a-381b-4183-bd5b-b04edbe7f2fc"/>
+    <ds:schemaRef ds:uri="http://purl.org/dc/terms/"/>
     <ds:schemaRef ds:uri="http://schemas.microsoft.com/office/2006/documentManagement/types"/>
+    <ds:schemaRef ds:uri="http://schemas.microsoft.com/office/2006/metadata/properties"/>
     <ds:schemaRef ds:uri="http://schemas.microsoft.com/office/infopath/2007/PartnerControls"/>
-    <ds:schemaRef ds:uri="http://schemas.microsoft.com/office/2006/metadata/properties"/>
     <ds:schemaRef ds:uri="http://www.w3.org/XML/1998/namespace"/>
-    <ds:schemaRef ds:uri="http://purl.org/dc/elements/1.1/"/>
   </ds:schemaRefs>
 </ds:datastoreItem>
 </file>
 
 <file path=customXml/itemProps2.xml><?xml version="1.0" encoding="utf-8"?>
+<ds:datastoreItem xmlns:ds="http://schemas.openxmlformats.org/officeDocument/2006/customXml" ds:itemID="{1B4E9660-639F-46B2-8BCF-B0443586500E}">
+  <ds:schemaRefs>
+    <ds:schemaRef ds:uri="http://schemas.microsoft.com/sharepoint/v3/contenttype/forms"/>
+  </ds:schemaRefs>
+</ds:datastoreItem>
+</file>
+
+<file path=customXml/itemProps3.xml><?xml version="1.0" encoding="utf-8"?>
 <ds:datastoreItem xmlns:ds="http://schemas.openxmlformats.org/officeDocument/2006/customXml" ds:itemID="{EE657BFB-479C-4A9F-8498-0A887E142927}">
   <ds:schemaRefs>
     <ds:schemaRef ds:uri="http://schemas.microsoft.com/office/2006/metadata/contentType"/>
@@ -11966,12 +11997,4 @@
     <ds:schemaRef ds:uri="http://schemas.microsoft.com/internal/obd"/>
   </ds:schemaRefs>
 </ds:datastoreItem>
-</file>
-
-<file path=customXml/itemProps3.xml><?xml version="1.0" encoding="utf-8"?>
-<ds:datastoreItem xmlns:ds="http://schemas.openxmlformats.org/officeDocument/2006/customXml" ds:itemID="{1B4E9660-639F-46B2-8BCF-B0443586500E}">
-  <ds:schemaRefs>
-    <ds:schemaRef ds:uri="http://schemas.microsoft.com/sharepoint/v3/contenttype/forms"/>
-  </ds:schemaRefs>
-</ds:datastoreItem>
 </file>
</xml_diff>